<commit_message>
Apuntes y guía física
</commit_message>
<xml_diff>
--- a/Costos y presupuestos/Contabilidad Básica (2).pptx
+++ b/Costos y presupuestos/Contabilidad Básica (2).pptx
@@ -270,7 +270,7 @@
           <a:p>
             <a:fld id="{496FE135-F828-42BD-94DF-D7C9CB3173DC}" type="datetimeFigureOut">
               <a:rPr lang="es-CL" smtClean="0"/>
-              <a:t>11-03-2020</a:t>
+              <a:t>12-03-2020</a:t>
             </a:fld>
             <a:endParaRPr lang="es-CL"/>
           </a:p>
@@ -816,7 +816,7 @@
           <a:p>
             <a:fld id="{781CC60F-56F0-4FD1-8DF1-469A5F1E47B8}" type="datetime1">
               <a:rPr lang="es-ES" smtClean="0"/>
-              <a:t>11/03/2020</a:t>
+              <a:t>12/03/2020</a:t>
             </a:fld>
             <a:endParaRPr lang="es-ES"/>
           </a:p>
@@ -1169,7 +1169,7 @@
           <a:p>
             <a:fld id="{9155CE5C-B5DF-4456-945D-218F60FE256B}" type="datetime1">
               <a:rPr lang="es-ES" smtClean="0"/>
-              <a:t>11/03/2020</a:t>
+              <a:t>12/03/2020</a:t>
             </a:fld>
             <a:endParaRPr lang="es-ES"/>
           </a:p>
@@ -1344,7 +1344,7 @@
           <a:p>
             <a:fld id="{7258507E-EA12-42FA-8860-EB65195B291E}" type="datetime1">
               <a:rPr lang="es-ES" smtClean="0"/>
-              <a:t>11/03/2020</a:t>
+              <a:t>12/03/2020</a:t>
             </a:fld>
             <a:endParaRPr lang="es-ES"/>
           </a:p>
@@ -1457,7 +1457,7 @@
           <a:p>
             <a:fld id="{0B448EB6-576C-49B4-812D-0B65791B89BF}" type="datetime1">
               <a:rPr lang="es-ES" smtClean="0"/>
-              <a:t>11/03/2020</a:t>
+              <a:t>12/03/2020</a:t>
             </a:fld>
             <a:endParaRPr lang="es-ES"/>
           </a:p>
@@ -1815,7 +1815,7 @@
           <a:p>
             <a:fld id="{CD04AFF7-BC56-459D-B182-1770762D603A}" type="datetime1">
               <a:rPr lang="es-ES" smtClean="0"/>
-              <a:t>11/03/2020</a:t>
+              <a:t>12/03/2020</a:t>
             </a:fld>
             <a:endParaRPr lang="es-ES"/>
           </a:p>
@@ -2080,7 +2080,7 @@
           <a:p>
             <a:fld id="{67B35186-4DDF-440F-88EB-B137C1D4E281}" type="datetime1">
               <a:rPr lang="es-ES" smtClean="0"/>
-              <a:t>11/03/2020</a:t>
+              <a:t>12/03/2020</a:t>
             </a:fld>
             <a:endParaRPr lang="es-ES"/>
           </a:p>
@@ -2442,7 +2442,7 @@
           <a:p>
             <a:fld id="{EBB8FEF9-791A-4B0B-B827-BE256CF1DC33}" type="datetime1">
               <a:rPr lang="es-ES" smtClean="0"/>
-              <a:t>11/03/2020</a:t>
+              <a:t>12/03/2020</a:t>
             </a:fld>
             <a:endParaRPr lang="es-ES"/>
           </a:p>
@@ -2669,7 +2669,7 @@
           <a:p>
             <a:fld id="{A2295A4E-891F-44DC-B5AB-C27944D07EF6}" type="datetime1">
               <a:rPr lang="es-ES" smtClean="0"/>
-              <a:t>11/03/2020</a:t>
+              <a:t>12/03/2020</a:t>
             </a:fld>
             <a:endParaRPr lang="es-ES"/>
           </a:p>
@@ -2759,7 +2759,7 @@
           <a:p>
             <a:fld id="{9C2E7C88-7586-45A5-97A7-2586B777CBD5}" type="datetime1">
               <a:rPr lang="es-ES" smtClean="0"/>
-              <a:t>11/03/2020</a:t>
+              <a:t>12/03/2020</a:t>
             </a:fld>
             <a:endParaRPr lang="es-ES"/>
           </a:p>
@@ -3026,7 +3026,7 @@
           <a:p>
             <a:fld id="{9639CCBB-7154-44BD-9D17-360168F8EA20}" type="datetime1">
               <a:rPr lang="es-ES" smtClean="0"/>
-              <a:t>11/03/2020</a:t>
+              <a:t>12/03/2020</a:t>
             </a:fld>
             <a:endParaRPr lang="es-ES"/>
           </a:p>
@@ -3254,7 +3254,7 @@
           <a:p>
             <a:fld id="{E01CEC48-F44E-4727-BD3F-28E23F01E6C2}" type="datetime1">
               <a:rPr lang="es-ES" smtClean="0"/>
-              <a:t>11/03/2020</a:t>
+              <a:t>12/03/2020</a:t>
             </a:fld>
             <a:endParaRPr lang="es-ES"/>
           </a:p>
@@ -3753,7 +3753,7 @@
           <a:p>
             <a:fld id="{7417F784-32E8-468D-9888-8A135FEB42CE}" type="datetime1">
               <a:rPr lang="es-ES" smtClean="0"/>
-              <a:t>11/03/2020</a:t>
+              <a:t>12/03/2020</a:t>
             </a:fld>
             <a:endParaRPr lang="es-ES"/>
           </a:p>
@@ -7216,7 +7216,7 @@
             </a:r>
             <a:r>
               <a:rPr lang="es-ES" dirty="0" err="1"/>
-              <a:t>Ejm</a:t>
+              <a:t>Ej</a:t>
             </a:r>
             <a:r>
               <a:rPr lang="es-ES" dirty="0"/>
@@ -7234,7 +7234,7 @@
             </a:r>
             <a:r>
               <a:rPr lang="es-ES" dirty="0" err="1"/>
-              <a:t>Ejm</a:t>
+              <a:t>Ej</a:t>
             </a:r>
             <a:r>
               <a:rPr lang="es-ES" dirty="0"/>

</xml_diff>